<commit_message>
adding project rough draft
</commit_message>
<xml_diff>
--- a/fairlie/Improving_Resonance_of_Twitter_Content_in_Counter_ISIS.pptx
+++ b/fairlie/Improving_Resonance_of_Twitter_Content_in_Counter_ISIS.pptx
@@ -11,6 +11,9 @@
     <p:sldId id="259" r:id="rId5"/>
     <p:sldId id="260" r:id="rId6"/>
     <p:sldId id="262" r:id="rId7"/>
+    <p:sldId id="263" r:id="rId8"/>
+    <p:sldId id="264" r:id="rId9"/>
+    <p:sldId id="265" r:id="rId10"/>
   </p:sldIdLst>
   <p:sldSz cx="9144000" cy="6858000" type="screen4x3"/>
   <p:notesSz cx="6858000" cy="9144000"/>
@@ -419,7 +422,7 @@
           <a:p>
             <a:fld id="{92FB58C4-B294-41A3-849A-07E6C9B4546E}" type="datetimeFigureOut">
               <a:rPr lang="en-US" smtClean="0"/>
-              <a:t>3/20/2015</a:t>
+              <a:t>4/10/2015</a:t>
             </a:fld>
             <a:endParaRPr lang="en-US"/>
           </a:p>
@@ -610,7 +613,7 @@
           <a:p>
             <a:fld id="{92FB58C4-B294-41A3-849A-07E6C9B4546E}" type="datetimeFigureOut">
               <a:rPr lang="en-US" smtClean="0"/>
-              <a:t>3/20/2015</a:t>
+              <a:t>4/10/2015</a:t>
             </a:fld>
             <a:endParaRPr lang="en-US"/>
           </a:p>
@@ -795,7 +798,7 @@
           <a:p>
             <a:fld id="{92FB58C4-B294-41A3-849A-07E6C9B4546E}" type="datetimeFigureOut">
               <a:rPr lang="en-US" smtClean="0"/>
-              <a:t>3/20/2015</a:t>
+              <a:t>4/10/2015</a:t>
             </a:fld>
             <a:endParaRPr lang="en-US"/>
           </a:p>
@@ -1058,7 +1061,7 @@
           <a:p>
             <a:fld id="{92FB58C4-B294-41A3-849A-07E6C9B4546E}" type="datetimeFigureOut">
               <a:rPr lang="en-US" smtClean="0"/>
-              <a:t>3/20/2015</a:t>
+              <a:t>4/10/2015</a:t>
             </a:fld>
             <a:endParaRPr lang="en-US"/>
           </a:p>
@@ -1474,7 +1477,7 @@
           <a:p>
             <a:fld id="{92FB58C4-B294-41A3-849A-07E6C9B4546E}" type="datetimeFigureOut">
               <a:rPr lang="en-US" smtClean="0"/>
-              <a:t>3/20/2015</a:t>
+              <a:t>4/10/2015</a:t>
             </a:fld>
             <a:endParaRPr lang="en-US"/>
           </a:p>
@@ -1716,7 +1719,7 @@
           <a:p>
             <a:fld id="{92FB58C4-B294-41A3-849A-07E6C9B4546E}" type="datetimeFigureOut">
               <a:rPr lang="en-US" smtClean="0"/>
-              <a:t>3/20/2015</a:t>
+              <a:t>4/10/2015</a:t>
             </a:fld>
             <a:endParaRPr lang="en-US"/>
           </a:p>
@@ -1952,7 +1955,7 @@
           <a:p>
             <a:fld id="{92FB58C4-B294-41A3-849A-07E6C9B4546E}" type="datetimeFigureOut">
               <a:rPr lang="en-US" smtClean="0"/>
-              <a:t>3/20/2015</a:t>
+              <a:t>4/10/2015</a:t>
             </a:fld>
             <a:endParaRPr lang="en-US"/>
           </a:p>
@@ -2147,7 +2150,7 @@
           <a:p>
             <a:fld id="{92FB58C4-B294-41A3-849A-07E6C9B4546E}" type="datetimeFigureOut">
               <a:rPr lang="en-US" smtClean="0"/>
-              <a:t>3/20/2015</a:t>
+              <a:t>4/10/2015</a:t>
             </a:fld>
             <a:endParaRPr lang="en-US"/>
           </a:p>
@@ -2245,7 +2248,7 @@
           <a:p>
             <a:fld id="{92FB58C4-B294-41A3-849A-07E6C9B4546E}" type="datetimeFigureOut">
               <a:rPr lang="en-US" smtClean="0"/>
-              <a:t>3/20/2015</a:t>
+              <a:t>4/10/2015</a:t>
             </a:fld>
             <a:endParaRPr lang="en-US"/>
           </a:p>
@@ -2381,7 +2384,7 @@
           <a:p>
             <a:fld id="{92FB58C4-B294-41A3-849A-07E6C9B4546E}" type="datetimeFigureOut">
               <a:rPr lang="en-US" smtClean="0"/>
-              <a:t>3/20/2015</a:t>
+              <a:t>4/10/2015</a:t>
             </a:fld>
             <a:endParaRPr lang="en-US"/>
           </a:p>
@@ -2899,7 +2902,7 @@
           <a:p>
             <a:fld id="{92FB58C4-B294-41A3-849A-07E6C9B4546E}" type="datetimeFigureOut">
               <a:rPr lang="en-US" smtClean="0"/>
-              <a:t>3/20/2015</a:t>
+              <a:t>4/10/2015</a:t>
             </a:fld>
             <a:endParaRPr lang="en-US"/>
           </a:p>
@@ -3160,7 +3163,7 @@
           <a:p>
             <a:fld id="{92FB58C4-B294-41A3-849A-07E6C9B4546E}" type="datetimeFigureOut">
               <a:rPr lang="en-US" smtClean="0"/>
-              <a:t>3/20/2015</a:t>
+              <a:t>4/10/2015</a:t>
             </a:fld>
             <a:endParaRPr lang="en-US"/>
           </a:p>
@@ -4166,11 +4169,7 @@
           <a:p>
             <a:r>
               <a:rPr lang="en-US" dirty="0" smtClean="0"/>
-              <a:t>Sort the various posted times of all of the tweets and group them into 30 minute or one hour blocks, in order to determine which blocks would be the best times to post messages</a:t>
-            </a:r>
-            <a:r>
-              <a:rPr lang="en-US" dirty="0" smtClean="0"/>
-              <a:t>.</a:t>
+              <a:t>Sort the various posted times of all of the tweets and group them into 30 minute or one hour blocks, in order to determine which blocks would be the best times to post messages.</a:t>
             </a:r>
           </a:p>
           <a:p>
@@ -4185,7 +4184,6 @@
               <a:rPr lang="en-US" dirty="0" smtClean="0"/>
               <a:t>High frequency of usage does not indicate influence.</a:t>
             </a:r>
-            <a:endParaRPr lang="en-US" dirty="0" smtClean="0"/>
           </a:p>
           <a:p>
             <a:endParaRPr lang="en-US" dirty="0" smtClean="0"/>
@@ -4351,6 +4349,360 @@
     <p:extLst>
       <p:ext uri="{BB962C8B-B14F-4D97-AF65-F5344CB8AC3E}">
         <p14:creationId xmlns:p14="http://schemas.microsoft.com/office/powerpoint/2010/main" val="1648323194"/>
+      </p:ext>
+    </p:extLst>
+  </p:cSld>
+  <p:clrMapOvr>
+    <a:masterClrMapping/>
+  </p:clrMapOvr>
+</p:sld>
+</file>
+
+<file path=ppt/slides/slide7.xml><?xml version="1.0" encoding="utf-8"?>
+<p:sld xmlns:a="http://schemas.openxmlformats.org/drawingml/2006/main" xmlns:r="http://schemas.openxmlformats.org/officeDocument/2006/relationships" xmlns:p="http://schemas.openxmlformats.org/presentationml/2006/main">
+  <p:cSld>
+    <p:spTree>
+      <p:nvGrpSpPr>
+        <p:cNvPr id="1" name=""/>
+        <p:cNvGrpSpPr/>
+        <p:nvPr/>
+      </p:nvGrpSpPr>
+      <p:grpSpPr>
+        <a:xfrm>
+          <a:off x="0" y="0"/>
+          <a:ext cx="0" cy="0"/>
+          <a:chOff x="0" y="0"/>
+          <a:chExt cx="0" cy="0"/>
+        </a:xfrm>
+      </p:grpSpPr>
+      <p:sp>
+        <p:nvSpPr>
+          <p:cNvPr id="2" name="Title 1"/>
+          <p:cNvSpPr>
+            <a:spLocks noGrp="1"/>
+          </p:cNvSpPr>
+          <p:nvPr>
+            <p:ph type="title"/>
+          </p:nvPr>
+        </p:nvSpPr>
+        <p:spPr/>
+        <p:txBody>
+          <a:bodyPr/>
+          <a:lstStyle/>
+          <a:p>
+            <a:r>
+              <a:rPr lang="en-US" dirty="0" smtClean="0"/>
+              <a:t>Updates (4/9/2015)</a:t>
+            </a:r>
+            <a:endParaRPr lang="en-US" dirty="0"/>
+          </a:p>
+        </p:txBody>
+      </p:sp>
+      <p:sp>
+        <p:nvSpPr>
+          <p:cNvPr id="3" name="Content Placeholder 2"/>
+          <p:cNvSpPr>
+            <a:spLocks noGrp="1"/>
+          </p:cNvSpPr>
+          <p:nvPr>
+            <p:ph sz="quarter" idx="1"/>
+          </p:nvPr>
+        </p:nvSpPr>
+        <p:spPr/>
+        <p:txBody>
+          <a:bodyPr/>
+          <a:lstStyle/>
+          <a:p>
+            <a:r>
+              <a:rPr lang="en-US" dirty="0" smtClean="0"/>
+              <a:t>Reducing the scope: </a:t>
+            </a:r>
+          </a:p>
+          <a:p>
+            <a:pPr lvl="1"/>
+            <a:r>
+              <a:rPr lang="en-US" dirty="0" smtClean="0"/>
+              <a:t>Pulling a small dataset from the Twitter API</a:t>
+            </a:r>
+            <a:endParaRPr lang="en-US" dirty="0"/>
+          </a:p>
+          <a:p>
+            <a:pPr lvl="1"/>
+            <a:r>
+              <a:rPr lang="en-US" dirty="0" smtClean="0"/>
+              <a:t>Limiting this project to looking at the best times of day to post.</a:t>
+            </a:r>
+            <a:endParaRPr lang="en-US" dirty="0"/>
+          </a:p>
+        </p:txBody>
+      </p:sp>
+    </p:spTree>
+    <p:extLst>
+      <p:ext uri="{BB962C8B-B14F-4D97-AF65-F5344CB8AC3E}">
+        <p14:creationId xmlns:p14="http://schemas.microsoft.com/office/powerpoint/2010/main" val="837090278"/>
+      </p:ext>
+    </p:extLst>
+  </p:cSld>
+  <p:clrMapOvr>
+    <a:masterClrMapping/>
+  </p:clrMapOvr>
+</p:sld>
+</file>
+
+<file path=ppt/slides/slide8.xml><?xml version="1.0" encoding="utf-8"?>
+<p:sld xmlns:a="http://schemas.openxmlformats.org/drawingml/2006/main" xmlns:r="http://schemas.openxmlformats.org/officeDocument/2006/relationships" xmlns:p="http://schemas.openxmlformats.org/presentationml/2006/main">
+  <p:cSld>
+    <p:spTree>
+      <p:nvGrpSpPr>
+        <p:cNvPr id="1" name=""/>
+        <p:cNvGrpSpPr/>
+        <p:nvPr/>
+      </p:nvGrpSpPr>
+      <p:grpSpPr>
+        <a:xfrm>
+          <a:off x="0" y="0"/>
+          <a:ext cx="0" cy="0"/>
+          <a:chOff x="0" y="0"/>
+          <a:chExt cx="0" cy="0"/>
+        </a:xfrm>
+      </p:grpSpPr>
+      <p:sp>
+        <p:nvSpPr>
+          <p:cNvPr id="2" name="Title 1"/>
+          <p:cNvSpPr>
+            <a:spLocks noGrp="1"/>
+          </p:cNvSpPr>
+          <p:nvPr>
+            <p:ph type="title"/>
+          </p:nvPr>
+        </p:nvSpPr>
+        <p:spPr/>
+        <p:txBody>
+          <a:bodyPr/>
+          <a:lstStyle/>
+          <a:p>
+            <a:r>
+              <a:rPr lang="en-US" dirty="0" smtClean="0"/>
+              <a:t>Progress?</a:t>
+            </a:r>
+            <a:endParaRPr lang="en-US" dirty="0"/>
+          </a:p>
+        </p:txBody>
+      </p:sp>
+      <p:sp>
+        <p:nvSpPr>
+          <p:cNvPr id="3" name="Content Placeholder 2"/>
+          <p:cNvSpPr>
+            <a:spLocks noGrp="1"/>
+          </p:cNvSpPr>
+          <p:nvPr>
+            <p:ph sz="quarter" idx="1"/>
+          </p:nvPr>
+        </p:nvSpPr>
+        <p:spPr>
+          <a:xfrm>
+            <a:off x="612648" y="1600200"/>
+            <a:ext cx="8153400" cy="5257800"/>
+          </a:xfrm>
+        </p:spPr>
+        <p:txBody>
+          <a:bodyPr>
+            <a:noAutofit/>
+          </a:bodyPr>
+          <a:lstStyle/>
+          <a:p>
+            <a:r>
+              <a:rPr lang="en-US" sz="2000" dirty="0" smtClean="0"/>
+              <a:t>Written the script to pull Tweets that meet one of three criteria:</a:t>
+            </a:r>
+          </a:p>
+          <a:p>
+            <a:pPr lvl="1"/>
+            <a:r>
+              <a:rPr lang="en-US" sz="2000" dirty="0" smtClean="0"/>
+              <a:t>Tweets containing </a:t>
+            </a:r>
+            <a:r>
+              <a:rPr lang="en-US" sz="2000" dirty="0"/>
+              <a:t>the following hashtags:</a:t>
+            </a:r>
+          </a:p>
+          <a:p>
+            <a:pPr lvl="2"/>
+            <a:r>
+              <a:rPr lang="en-US" sz="1800" dirty="0"/>
+              <a:t>#ISIS</a:t>
+            </a:r>
+          </a:p>
+          <a:p>
+            <a:pPr lvl="2"/>
+            <a:r>
+              <a:rPr lang="ar-AE" sz="1800" dirty="0"/>
+              <a:t>الدولة_الإسلامية_في_العراق_والشام</a:t>
+            </a:r>
+            <a:endParaRPr lang="en-US" sz="1800" dirty="0"/>
+          </a:p>
+          <a:p>
+            <a:pPr lvl="2"/>
+            <a:r>
+              <a:rPr lang="ar-AE" sz="1800" dirty="0"/>
+              <a:t>الدولة_الإسلامية</a:t>
+            </a:r>
+            <a:endParaRPr lang="en-US" sz="1800" dirty="0"/>
+          </a:p>
+          <a:p>
+            <a:pPr lvl="1"/>
+            <a:r>
+              <a:rPr lang="en-US" sz="2000" dirty="0" smtClean="0"/>
+              <a:t>Tweets containing the following terms:</a:t>
+            </a:r>
+          </a:p>
+          <a:p>
+            <a:pPr lvl="2"/>
+            <a:r>
+              <a:rPr lang="ar-AE" sz="1800" dirty="0"/>
+              <a:t>الدولة </a:t>
+            </a:r>
+            <a:r>
+              <a:rPr lang="ar-AE" sz="1800" dirty="0" smtClean="0"/>
+              <a:t>الإسلامية</a:t>
+            </a:r>
+            <a:endParaRPr lang="en-US" sz="1800" dirty="0" smtClean="0"/>
+          </a:p>
+          <a:p>
+            <a:pPr lvl="2"/>
+            <a:r>
+              <a:rPr lang="ar-AE" sz="1800" dirty="0" smtClean="0"/>
+              <a:t>الصفويين</a:t>
+            </a:r>
+            <a:endParaRPr lang="en-US" sz="1800" dirty="0" smtClean="0"/>
+          </a:p>
+          <a:p>
+            <a:pPr lvl="2"/>
+            <a:r>
+              <a:rPr lang="ar-AE" sz="1800" dirty="0" smtClean="0"/>
+              <a:t>الموصل</a:t>
+            </a:r>
+            <a:endParaRPr lang="en-US" sz="1800" dirty="0" smtClean="0"/>
+          </a:p>
+          <a:p>
+            <a:pPr lvl="1"/>
+            <a:r>
+              <a:rPr lang="en-US" sz="2000" dirty="0" smtClean="0"/>
+              <a:t>Tweets issued by specific pro-ISIS users</a:t>
+            </a:r>
+          </a:p>
+          <a:p>
+            <a:r>
+              <a:rPr lang="en-US" sz="2000" dirty="0" smtClean="0"/>
+              <a:t>Written a portion of a script to take the data and create a column titled “Created at,” group the various Tweets by their posted times into 30 minute blocks.</a:t>
+            </a:r>
+          </a:p>
+          <a:p>
+            <a:r>
+              <a:rPr lang="en-US" sz="2000" dirty="0" smtClean="0"/>
+              <a:t>Written a portion of script that will display the data in a line graph.</a:t>
+            </a:r>
+          </a:p>
+        </p:txBody>
+      </p:sp>
+    </p:spTree>
+    <p:extLst>
+      <p:ext uri="{BB962C8B-B14F-4D97-AF65-F5344CB8AC3E}">
+        <p14:creationId xmlns:p14="http://schemas.microsoft.com/office/powerpoint/2010/main" val="664885727"/>
+      </p:ext>
+    </p:extLst>
+  </p:cSld>
+  <p:clrMapOvr>
+    <a:masterClrMapping/>
+  </p:clrMapOvr>
+</p:sld>
+</file>
+
+<file path=ppt/slides/slide9.xml><?xml version="1.0" encoding="utf-8"?>
+<p:sld xmlns:a="http://schemas.openxmlformats.org/drawingml/2006/main" xmlns:r="http://schemas.openxmlformats.org/officeDocument/2006/relationships" xmlns:p="http://schemas.openxmlformats.org/presentationml/2006/main">
+  <p:cSld>
+    <p:spTree>
+      <p:nvGrpSpPr>
+        <p:cNvPr id="1" name=""/>
+        <p:cNvGrpSpPr/>
+        <p:nvPr/>
+      </p:nvGrpSpPr>
+      <p:grpSpPr>
+        <a:xfrm>
+          <a:off x="0" y="0"/>
+          <a:ext cx="0" cy="0"/>
+          <a:chOff x="0" y="0"/>
+          <a:chExt cx="0" cy="0"/>
+        </a:xfrm>
+      </p:grpSpPr>
+      <p:sp>
+        <p:nvSpPr>
+          <p:cNvPr id="2" name="Title 1"/>
+          <p:cNvSpPr>
+            <a:spLocks noGrp="1"/>
+          </p:cNvSpPr>
+          <p:nvPr>
+            <p:ph type="title"/>
+          </p:nvPr>
+        </p:nvSpPr>
+        <p:spPr/>
+        <p:txBody>
+          <a:bodyPr/>
+          <a:lstStyle/>
+          <a:p>
+            <a:r>
+              <a:rPr lang="en-US" dirty="0" smtClean="0"/>
+              <a:t>Existing Issues</a:t>
+            </a:r>
+            <a:endParaRPr lang="en-US" dirty="0"/>
+          </a:p>
+        </p:txBody>
+      </p:sp>
+      <p:sp>
+        <p:nvSpPr>
+          <p:cNvPr id="3" name="Content Placeholder 2"/>
+          <p:cNvSpPr>
+            <a:spLocks noGrp="1"/>
+          </p:cNvSpPr>
+          <p:nvPr>
+            <p:ph sz="quarter" idx="1"/>
+          </p:nvPr>
+        </p:nvSpPr>
+        <p:spPr/>
+        <p:txBody>
+          <a:bodyPr/>
+          <a:lstStyle/>
+          <a:p>
+            <a:r>
+              <a:rPr lang="en-US" dirty="0" smtClean="0"/>
+              <a:t>Need to properly join the portion that organizes and plots the time data</a:t>
+            </a:r>
+          </a:p>
+          <a:p>
+            <a:pPr lvl="1"/>
+            <a:r>
+              <a:rPr lang="en-US" dirty="0" smtClean="0"/>
+              <a:t>Scripts were written separate from one another while on travel for work.</a:t>
+            </a:r>
+          </a:p>
+          <a:p>
+            <a:r>
+              <a:rPr lang="en-US" dirty="0" err="1" smtClean="0"/>
+              <a:t>Spyder</a:t>
+            </a:r>
+            <a:r>
+              <a:rPr lang="en-US" dirty="0" smtClean="0"/>
+              <a:t> appears to mess with some of the Arabic characters, affecting the collection of certain hashtags and terms</a:t>
+            </a:r>
+            <a:endParaRPr lang="en-US" dirty="0"/>
+          </a:p>
+        </p:txBody>
+      </p:sp>
+    </p:spTree>
+    <p:extLst>
+      <p:ext uri="{BB962C8B-B14F-4D97-AF65-F5344CB8AC3E}">
+        <p14:creationId xmlns:p14="http://schemas.microsoft.com/office/powerpoint/2010/main" val="3856271119"/>
       </p:ext>
     </p:extLst>
   </p:cSld>

</xml_diff>